<commit_message>
adding pathlib to forecast
</commit_message>
<xml_diff>
--- a/Machine_Learning_in_Online_Marketing.pptx
+++ b/Machine_Learning_in_Online_Marketing.pptx
@@ -25888,7 +25888,7 @@
             </a:pPr>
             <a:r>
               <a:rPr lang="de-DE" sz="2400" dirty="0"/>
-              <a:t>Hinzufügen von neuen Kampagnen-Ergebnissen</a:t>
+              <a:t>Hinzufügen von neuen Kampagnen-Ergebnissen.</a:t>
             </a:r>
           </a:p>
           <a:p>
@@ -25899,7 +25899,7 @@
             </a:pPr>
             <a:r>
               <a:rPr lang="de-DE" sz="2400" dirty="0"/>
-              <a:t>Eingabe von angebotenen Liefermengen</a:t>
+              <a:t>Eingabe von angebotenen Liefermengen.</a:t>
             </a:r>
           </a:p>
           <a:p>
@@ -25910,7 +25910,7 @@
             </a:pPr>
             <a:r>
               <a:rPr lang="de-DE" sz="2400" dirty="0"/>
-              <a:t>Ausgabe von Budget-Allokation und Umsatz-Prognose</a:t>
+              <a:t>Ausgabe von Budget-Allokation für den maximal erzielbaren Umsatz.</a:t>
             </a:r>
           </a:p>
           <a:p>
@@ -29437,15 +29437,6 @@
 </file>
 
 <file path=customXml/item2.xml><?xml version="1.0" encoding="utf-8"?>
-<?mso-contentType ?>
-<FormTemplates xmlns="http://schemas.microsoft.com/sharepoint/v3/contenttype/forms">
-  <Display>DocumentLibraryForm</Display>
-  <Edit>DocumentLibraryForm</Edit>
-  <New>DocumentLibraryForm</New>
-</FormTemplates>
-</file>
-
-<file path=customXml/item3.xml><?xml version="1.0" encoding="utf-8"?>
 <ct:contentTypeSchema xmlns:ct="http://schemas.microsoft.com/office/2006/metadata/contentType" xmlns:ma="http://schemas.microsoft.com/office/2006/metadata/properties/metaAttributes" ct:_="" ma:_="" ma:contentTypeName="Document" ma:contentTypeID="0x01010079F111ED35F8CC479449609E8A0923A6" ma:contentTypeVersion="28" ma:contentTypeDescription="Create a new document." ma:contentTypeScope="" ma:versionID="60f5a4f2d2b0abadcf532d48ebf9cb71">
   <xsd:schema xmlns:xsd="http://www.w3.org/2001/XMLSchema" xmlns:xs="http://www.w3.org/2001/XMLSchema" xmlns:p="http://schemas.microsoft.com/office/2006/metadata/properties" xmlns:ns1="http://schemas.microsoft.com/sharepoint/v3" xmlns:ns2="71af3243-3dd4-4a8d-8c0d-dd76da1f02a5" xmlns:ns3="16c05727-aa75-4e4a-9b5f-8a80a1165891" xmlns:ns4="230e9df3-be65-4c73-a93b-d1236ebd677e" targetNamespace="http://schemas.microsoft.com/office/2006/metadata/properties" ma:root="true" ma:fieldsID="7dd78129e6a1811f84807ad11c651531" ns1:_="" ns2:_="" ns3:_="" ns4:_="">
     <xsd:import namespace="http://schemas.microsoft.com/sharepoint/v3"/>
@@ -29757,6 +29748,15 @@
 </ct:contentTypeSchema>
 </file>
 
+<file path=customXml/item3.xml><?xml version="1.0" encoding="utf-8"?>
+<?mso-contentType ?>
+<FormTemplates xmlns="http://schemas.microsoft.com/sharepoint/v3/contenttype/forms">
+  <Display>DocumentLibraryForm</Display>
+  <Edit>DocumentLibraryForm</Edit>
+  <New>DocumentLibraryForm</New>
+</FormTemplates>
+</file>
+
 <file path=customXml/itemProps1.xml><?xml version="1.0" encoding="utf-8"?>
 <ds:datastoreItem xmlns:ds="http://schemas.openxmlformats.org/officeDocument/2006/customXml" ds:itemID="{0F65614A-92F9-4391-AC3D-F3F5B0704F99}">
   <ds:schemaRefs>
@@ -29770,14 +29770,6 @@
 </file>
 
 <file path=customXml/itemProps2.xml><?xml version="1.0" encoding="utf-8"?>
-<ds:datastoreItem xmlns:ds="http://schemas.openxmlformats.org/officeDocument/2006/customXml" ds:itemID="{8451406B-581B-4C29-A833-E33D8A6AB075}">
-  <ds:schemaRefs>
-    <ds:schemaRef ds:uri="http://schemas.microsoft.com/sharepoint/v3/contenttype/forms"/>
-  </ds:schemaRefs>
-</ds:datastoreItem>
-</file>
-
-<file path=customXml/itemProps3.xml><?xml version="1.0" encoding="utf-8"?>
 <ds:datastoreItem xmlns:ds="http://schemas.openxmlformats.org/officeDocument/2006/customXml" ds:itemID="{18903D25-5BE2-4D9E-B7D8-BE1DCAE2DC41}">
   <ds:schemaRefs>
     <ds:schemaRef ds:uri="http://schemas.microsoft.com/office/2006/metadata/contentType"/>
@@ -29798,6 +29790,14 @@
 </ds:datastoreItem>
 </file>
 
+<file path=customXml/itemProps3.xml><?xml version="1.0" encoding="utf-8"?>
+<ds:datastoreItem xmlns:ds="http://schemas.openxmlformats.org/officeDocument/2006/customXml" ds:itemID="{8451406B-581B-4C29-A833-E33D8A6AB075}">
+  <ds:schemaRefs>
+    <ds:schemaRef ds:uri="http://schemas.microsoft.com/sharepoint/v3/contenttype/forms"/>
+  </ds:schemaRefs>
+</ds:datastoreItem>
+</file>
+
 <file path=docMetadata/LabelInfo.xml><?xml version="1.0" encoding="utf-8"?>
 <clbl:labelList xmlns:clbl="http://schemas.microsoft.com/office/2020/mipLabelMetadata"/>
 </file>
</xml_diff>